<commit_message>
Updated final report formatting
</commit_message>
<xml_diff>
--- a/game_loc_prioritizer/reports/figures/JOD - Steam Recommendation System Capstone Presentation.pptx
+++ b/game_loc_prioritizer/reports/figures/JOD - Steam Recommendation System Capstone Presentation.pptx
@@ -270,7 +270,7 @@
           <a:p>
             <a:fld id="{6CA0B634-8218-4D60-AF0A-05E79207F433}" type="datetimeFigureOut">
               <a:rPr lang="en-US" smtClean="0"/>
-              <a:t>4/18/2024</a:t>
+              <a:t>4/19/2024</a:t>
             </a:fld>
             <a:endParaRPr lang="en-US"/>
           </a:p>
@@ -468,7 +468,7 @@
           <a:p>
             <a:fld id="{6CA0B634-8218-4D60-AF0A-05E79207F433}" type="datetimeFigureOut">
               <a:rPr lang="en-US" smtClean="0"/>
-              <a:t>4/18/2024</a:t>
+              <a:t>4/19/2024</a:t>
             </a:fld>
             <a:endParaRPr lang="en-US"/>
           </a:p>
@@ -676,7 +676,7 @@
           <a:p>
             <a:fld id="{6CA0B634-8218-4D60-AF0A-05E79207F433}" type="datetimeFigureOut">
               <a:rPr lang="en-US" smtClean="0"/>
-              <a:t>4/18/2024</a:t>
+              <a:t>4/19/2024</a:t>
             </a:fld>
             <a:endParaRPr lang="en-US"/>
           </a:p>
@@ -876,7 +876,7 @@
           <a:p>
             <a:fld id="{6CA0B634-8218-4D60-AF0A-05E79207F433}" type="datetimeFigureOut">
               <a:rPr lang="en-US" smtClean="0"/>
-              <a:t>4/18/2024</a:t>
+              <a:t>4/19/2024</a:t>
             </a:fld>
             <a:endParaRPr lang="en-US"/>
           </a:p>
@@ -1151,7 +1151,7 @@
           <a:p>
             <a:fld id="{6CA0B634-8218-4D60-AF0A-05E79207F433}" type="datetimeFigureOut">
               <a:rPr lang="en-US" smtClean="0"/>
-              <a:t>4/18/2024</a:t>
+              <a:t>4/19/2024</a:t>
             </a:fld>
             <a:endParaRPr lang="en-US"/>
           </a:p>
@@ -1416,7 +1416,7 @@
           <a:p>
             <a:fld id="{6CA0B634-8218-4D60-AF0A-05E79207F433}" type="datetimeFigureOut">
               <a:rPr lang="en-US" smtClean="0"/>
-              <a:t>4/18/2024</a:t>
+              <a:t>4/19/2024</a:t>
             </a:fld>
             <a:endParaRPr lang="en-US"/>
           </a:p>
@@ -1828,7 +1828,7 @@
           <a:p>
             <a:fld id="{6CA0B634-8218-4D60-AF0A-05E79207F433}" type="datetimeFigureOut">
               <a:rPr lang="en-US" smtClean="0"/>
-              <a:t>4/18/2024</a:t>
+              <a:t>4/19/2024</a:t>
             </a:fld>
             <a:endParaRPr lang="en-US"/>
           </a:p>
@@ -1969,7 +1969,7 @@
           <a:p>
             <a:fld id="{6CA0B634-8218-4D60-AF0A-05E79207F433}" type="datetimeFigureOut">
               <a:rPr lang="en-US" smtClean="0"/>
-              <a:t>4/18/2024</a:t>
+              <a:t>4/19/2024</a:t>
             </a:fld>
             <a:endParaRPr lang="en-US"/>
           </a:p>
@@ -2082,7 +2082,7 @@
           <a:p>
             <a:fld id="{6CA0B634-8218-4D60-AF0A-05E79207F433}" type="datetimeFigureOut">
               <a:rPr lang="en-US" smtClean="0"/>
-              <a:t>4/18/2024</a:t>
+              <a:t>4/19/2024</a:t>
             </a:fld>
             <a:endParaRPr lang="en-US"/>
           </a:p>
@@ -2393,7 +2393,7 @@
           <a:p>
             <a:fld id="{6CA0B634-8218-4D60-AF0A-05E79207F433}" type="datetimeFigureOut">
               <a:rPr lang="en-US" smtClean="0"/>
-              <a:t>4/18/2024</a:t>
+              <a:t>4/19/2024</a:t>
             </a:fld>
             <a:endParaRPr lang="en-US"/>
           </a:p>
@@ -2681,7 +2681,7 @@
           <a:p>
             <a:fld id="{6CA0B634-8218-4D60-AF0A-05E79207F433}" type="datetimeFigureOut">
               <a:rPr lang="en-US" smtClean="0"/>
-              <a:t>4/18/2024</a:t>
+              <a:t>4/19/2024</a:t>
             </a:fld>
             <a:endParaRPr lang="en-US"/>
           </a:p>
@@ -2922,7 +2922,7 @@
           <a:p>
             <a:fld id="{6CA0B634-8218-4D60-AF0A-05E79207F433}" type="datetimeFigureOut">
               <a:rPr lang="en-US" smtClean="0"/>
-              <a:t>4/18/2024</a:t>
+              <a:t>4/19/2024</a:t>
             </a:fld>
             <a:endParaRPr lang="en-US"/>
           </a:p>
@@ -16445,8 +16445,8 @@
         </p:nvSpPr>
         <p:spPr>
           <a:xfrm>
-            <a:off x="8849220" y="4912767"/>
-            <a:ext cx="2866031" cy="1021556"/>
+            <a:off x="8671352" y="4636499"/>
+            <a:ext cx="2552076" cy="1021556"/>
           </a:xfrm>
           <a:prstGeom prst="roundRect">
             <a:avLst/>
@@ -22213,7 +22213,7 @@
         </p:nvSpPr>
         <p:spPr>
           <a:xfrm>
-            <a:off x="886165" y="4600641"/>
+            <a:off x="831301" y="4600641"/>
             <a:ext cx="2623459" cy="923330"/>
           </a:xfrm>
           <a:prstGeom prst="rect">
@@ -22256,7 +22256,7 @@
         </p:nvSpPr>
         <p:spPr>
           <a:xfrm>
-            <a:off x="883670" y="5512822"/>
+            <a:off x="828806" y="5512822"/>
             <a:ext cx="2623459" cy="923330"/>
           </a:xfrm>
           <a:prstGeom prst="rect">
@@ -22299,8 +22299,8 @@
         </p:nvSpPr>
         <p:spPr>
           <a:xfrm>
-            <a:off x="948845" y="3237540"/>
-            <a:ext cx="2563357" cy="1021556"/>
+            <a:off x="905601" y="3237540"/>
+            <a:ext cx="2437674" cy="1021556"/>
           </a:xfrm>
           <a:prstGeom prst="roundRect">
             <a:avLst/>
@@ -24328,17 +24328,17 @@
         </p:nvSpPr>
         <p:spPr>
           <a:xfrm>
-            <a:off x="3911467" y="3127105"/>
-            <a:ext cx="913952" cy="772380"/>
+            <a:off x="3924299" y="3166332"/>
+            <a:ext cx="767769" cy="628377"/>
           </a:xfrm>
           <a:prstGeom prst="rightArrow">
             <a:avLst/>
           </a:prstGeom>
-          <a:solidFill>
-            <a:srgbClr val="2DC3F0"/>
-          </a:solidFill>
+          <a:noFill/>
           <a:ln>
-            <a:noFill/>
+            <a:solidFill>
+              <a:srgbClr val="2DC3F0"/>
+            </a:solidFill>
           </a:ln>
         </p:spPr>
         <p:style>
@@ -24380,17 +24380,17 @@
         </p:nvSpPr>
         <p:spPr>
           <a:xfrm>
-            <a:off x="6974780" y="3124244"/>
-            <a:ext cx="913952" cy="772380"/>
+            <a:off x="6987612" y="3163471"/>
+            <a:ext cx="767769" cy="628377"/>
           </a:xfrm>
           <a:prstGeom prst="rightArrow">
             <a:avLst/>
           </a:prstGeom>
-          <a:solidFill>
-            <a:srgbClr val="2DC3F0"/>
-          </a:solidFill>
+          <a:noFill/>
           <a:ln>
-            <a:noFill/>
+            <a:solidFill>
+              <a:srgbClr val="2DC3F0"/>
+            </a:solidFill>
           </a:ln>
         </p:spPr>
         <p:style>

</xml_diff>

<commit_message>
Still obsessing over final report formatting and COLORS!
</commit_message>
<xml_diff>
--- a/game_loc_prioritizer/reports/figures/JOD - Steam Recommendation System Capstone Presentation.pptx
+++ b/game_loc_prioritizer/reports/figures/JOD - Steam Recommendation System Capstone Presentation.pptx
@@ -21017,10 +21017,18 @@
               <a:buNone/>
             </a:pPr>
             <a:r>
-              <a:rPr lang="en-US" sz="3200" b="1" dirty="0"/>
+              <a:rPr lang="en-US" sz="3200" b="1" dirty="0">
+                <a:solidFill>
+                  <a:srgbClr val="2DC3F0"/>
+                </a:solidFill>
+              </a:rPr>
               <a:t>Model</a:t>
             </a:r>
-            <a:endParaRPr lang="en-US" sz="2000" dirty="0"/>
+            <a:endParaRPr lang="en-US" sz="2000" dirty="0">
+              <a:solidFill>
+                <a:srgbClr val="2DC3F0"/>
+              </a:solidFill>
+            </a:endParaRPr>
           </a:p>
         </p:txBody>
       </p:sp>
@@ -21384,8 +21392,9 @@
           </a:prstGeom>
           <a:ln w="38100">
             <a:solidFill>
-              <a:srgbClr val="2DC3F0"/>
+              <a:srgbClr val="59B600"/>
             </a:solidFill>
+            <a:prstDash val="sysDot"/>
             <a:tailEnd type="triangle"/>
           </a:ln>
         </p:spPr>
@@ -21435,7 +21444,7 @@
             <a:r>
               <a:rPr lang="en-US" dirty="0">
                 <a:solidFill>
-                  <a:srgbClr val="2DC3F0"/>
+                  <a:srgbClr val="59B600"/>
                 </a:solidFill>
               </a:rPr>
               <a:t>Cosine Sim.</a:t>
@@ -21709,8 +21718,9 @@
           </a:prstGeom>
           <a:ln w="38100">
             <a:solidFill>
-              <a:srgbClr val="2DC3F0"/>
+              <a:srgbClr val="59B600"/>
             </a:solidFill>
+            <a:prstDash val="sysDot"/>
             <a:tailEnd type="triangle"/>
           </a:ln>
         </p:spPr>
@@ -21876,8 +21886,9 @@
           </a:prstGeom>
           <a:ln w="38100">
             <a:solidFill>
-              <a:srgbClr val="2DC3F0"/>
+              <a:srgbClr val="59B600"/>
             </a:solidFill>
+            <a:prstDash val="sysDot"/>
             <a:tailEnd type="triangle"/>
           </a:ln>
         </p:spPr>
@@ -21921,8 +21932,9 @@
           </a:prstGeom>
           <a:ln w="38100">
             <a:solidFill>
-              <a:srgbClr val="2DC3F0"/>
+              <a:srgbClr val="59B600"/>
             </a:solidFill>
+            <a:prstDash val="sysDot"/>
             <a:tailEnd type="triangle"/>
           </a:ln>
         </p:spPr>
@@ -22089,12 +22101,14 @@
               <a:gd name="adj5" fmla="val 100000"/>
             </a:avLst>
           </a:prstGeom>
-          <a:noFill/>
-          <a:ln>
+          <a:solidFill>
+            <a:srgbClr val="2DC3F0"/>
+          </a:solidFill>
+          <a:ln w="57150">
             <a:solidFill>
               <a:srgbClr val="2DC3F0"/>
             </a:solidFill>
-            <a:prstDash val="sysDot"/>
+            <a:prstDash val="solid"/>
           </a:ln>
         </p:spPr>
         <p:style>
@@ -22157,12 +22171,14 @@
               <a:gd name="adj5" fmla="val 100000"/>
             </a:avLst>
           </a:prstGeom>
-          <a:noFill/>
-          <a:ln>
+          <a:solidFill>
+            <a:srgbClr val="2DC3F0"/>
+          </a:solidFill>
+          <a:ln w="57150">
             <a:solidFill>
               <a:srgbClr val="2DC3F0"/>
             </a:solidFill>
-            <a:prstDash val="sysDot"/>
+            <a:prstDash val="solid"/>
           </a:ln>
         </p:spPr>
         <p:style>
@@ -22610,7 +22626,7 @@
             <a:r>
               <a:rPr lang="en-US" dirty="0">
                 <a:solidFill>
-                  <a:srgbClr val="2DC3F0"/>
+                  <a:srgbClr val="59B600"/>
                 </a:solidFill>
               </a:rPr>
               <a:t>Cosine Sim.</a:t>

</xml_diff>

<commit_message>
There was a capitalization error in the pdf. CAPITALIZATION. Mission critical stuff here.
</commit_message>
<xml_diff>
--- a/game_loc_prioritizer/reports/figures/JOD - Steam Recommendation System Capstone Presentation.pptx
+++ b/game_loc_prioritizer/reports/figures/JOD - Steam Recommendation System Capstone Presentation.pptx
@@ -21170,7 +21170,15 @@
             <a:pPr algn="ctr"/>
             <a:r>
               <a:rPr lang="en-US" dirty="0"/>
-              <a:t>row values * sim. scores, sum cols</a:t>
+              <a:t>Row </a:t>
+            </a:r>
+            <a:r>
+              <a:rPr lang="en-US" dirty="0" err="1"/>
+              <a:t>vals</a:t>
+            </a:r>
+            <a:r>
+              <a:rPr lang="en-US" dirty="0"/>
+              <a:t> * sim. scores, sum cols</a:t>
             </a:r>
           </a:p>
           <a:p>
@@ -21180,7 +21188,7 @@
               <a:t>Select top </a:t>
             </a:r>
             <a:r>
-              <a:rPr lang="en-US" dirty="0">
+              <a:rPr lang="en-US">
                 <a:solidFill>
                   <a:srgbClr val="C21632"/>
                 </a:solidFill>
@@ -21188,8 +21196,12 @@
               <a:t>N</a:t>
             </a:r>
             <a:r>
+              <a:rPr lang="en-US"/>
+              <a:t> col </a:t>
+            </a:r>
+            <a:r>
               <a:rPr lang="en-US" dirty="0"/>
-              <a:t> column sums</a:t>
+              <a:t>sums</a:t>
             </a:r>
           </a:p>
           <a:p>

</xml_diff>